<commit_message>
template and starting to fill out...
</commit_message>
<xml_diff>
--- a/two_steps_forward_outline.pptx
+++ b/two_steps_forward_outline.pptx
@@ -1,6 +1,6 @@
 
 <file path=ppt/presentation.xml><?xml version="1.0" encoding="utf-8"?>
-<p:presentation xmlns:a="http://schemas.openxmlformats.org/drawingml/2006/main" xmlns:r="http://schemas.openxmlformats.org/officeDocument/2006/relationships" xmlns:p="http://schemas.openxmlformats.org/presentationml/2006/main" saveSubsetFonts="1" autoCompressPictures="0">
+<p:presentation xmlns:a="http://schemas.openxmlformats.org/drawingml/2006/main" xmlns:r="http://schemas.openxmlformats.org/officeDocument/2006/relationships" xmlns:p="http://schemas.openxmlformats.org/presentationml/2006/main" showSpecialPlsOnTitleSld="0" saveSubsetFonts="1" autoCompressPictures="0">
   <p:sldMasterIdLst>
     <p:sldMasterId id="2147483648" r:id="rId1"/>
   </p:sldMasterIdLst>
@@ -183,7 +183,7 @@
         </p:blipFill>
         <p:spPr>
           <a:xfrm>
-            <a:off x="0" y="746"/>
+            <a:off x="0" y="1493"/>
             <a:ext cx="9144000" cy="6856507"/>
           </a:xfrm>
           <a:prstGeom prst="rect">
@@ -666,7 +666,7 @@
 </file>
 
 <file path=ppt/slideLayouts/slideLayout2.xml><?xml version="1.0" encoding="utf-8"?>
-<p:sldLayout xmlns:a="http://schemas.openxmlformats.org/drawingml/2006/main" xmlns:r="http://schemas.openxmlformats.org/officeDocument/2006/relationships" xmlns:p="http://schemas.openxmlformats.org/presentationml/2006/main" type="obj" preserve="1">
+<p:sldLayout xmlns:a="http://schemas.openxmlformats.org/drawingml/2006/main" xmlns:r="http://schemas.openxmlformats.org/officeDocument/2006/relationships" xmlns:p="http://schemas.openxmlformats.org/presentationml/2006/main" showMasterSp="0" preserve="1" userDrawn="1">
   <p:cSld name="Title and content">
     <p:spTree>
       <p:nvGrpSpPr>
@@ -694,8 +694,8 @@
         </p:nvSpPr>
         <p:spPr>
           <a:xfrm>
-            <a:off x="457200" y="775152"/>
-            <a:ext cx="8229600" cy="1143000"/>
+            <a:off x="457200" y="107879"/>
+            <a:ext cx="8229600" cy="1016071"/>
           </a:xfrm>
           <a:prstGeom prst="rect">
             <a:avLst/>
@@ -747,8 +747,8 @@
         </p:nvSpPr>
         <p:spPr>
           <a:xfrm>
-            <a:off x="457200" y="2088682"/>
-            <a:ext cx="8229600" cy="4037481"/>
+            <a:off x="457200" y="1123951"/>
+            <a:ext cx="8229600" cy="5225148"/>
           </a:xfrm>
           <a:prstGeom prst="rect">
             <a:avLst/>
@@ -780,7 +780,7 @@
               </a:lnSpc>
               <a:buFont typeface="Arial" panose="020B0604020202020204" pitchFamily="34" charset="0"/>
               <a:buChar char="•"/>
-              <a:defRPr lang="en-US" sz="2800" kern="1200" dirty="0" smtClean="0">
+              <a:defRPr lang="en-US" sz="2400" kern="1200" dirty="0" smtClean="0">
                 <a:solidFill>
                   <a:schemeClr val="tx1"/>
                 </a:solidFill>
@@ -795,7 +795,7 @@
               </a:lnSpc>
               <a:buFont typeface="Arial" panose="020B0604020202020204" pitchFamily="34" charset="0"/>
               <a:buChar char="•"/>
-              <a:defRPr lang="en-US" sz="2800" kern="1200" dirty="0" smtClean="0">
+              <a:defRPr lang="en-US" sz="2000" kern="1200" dirty="0" smtClean="0">
                 <a:solidFill>
                   <a:schemeClr val="tx1"/>
                 </a:solidFill>
@@ -810,7 +810,7 @@
               </a:lnSpc>
               <a:buFont typeface="Arial" panose="020B0604020202020204" pitchFamily="34" charset="0"/>
               <a:buChar char="•"/>
-              <a:defRPr lang="en-US" sz="2800" kern="1200" dirty="0" smtClean="0">
+              <a:defRPr lang="en-US" sz="2000" kern="1200" dirty="0" smtClean="0">
                 <a:solidFill>
                   <a:schemeClr val="tx1"/>
                 </a:solidFill>
@@ -825,7 +825,7 @@
               </a:lnSpc>
               <a:buFont typeface="Arial" panose="020B0604020202020204" pitchFamily="34" charset="0"/>
               <a:buChar char="•"/>
-              <a:defRPr lang="en-US" sz="2800" kern="1200" dirty="0">
+              <a:defRPr lang="en-US" sz="2000" kern="1200" dirty="0">
                 <a:solidFill>
                   <a:schemeClr val="tx1"/>
                 </a:solidFill>
@@ -953,10 +953,10 @@
             </a:lvl1pPr>
           </a:lstStyle>
           <a:p>
-            <a:fld id="{E7C30082-2737-456A-A93C-9B3FCF7FD630}" type="datetime1">
-              <a:rPr lang="en-US" smtClean="0"/>
-              <a:t>10/5/2018</a:t>
-            </a:fld>
+            <a:r>
+              <a:rPr lang="en-US"/>
+              <a:t>2019-07-18</a:t>
+            </a:r>
             <a:endParaRPr lang="en-US" dirty="0"/>
           </a:p>
         </p:txBody>
@@ -1063,12 +1063,11 @@
   <p:clrMapOvr>
     <a:masterClrMapping/>
   </p:clrMapOvr>
-  <p:hf hdr="0"/>
 </p:sldLayout>
 </file>
 
 <file path=ppt/slideLayouts/slideLayout3.xml><?xml version="1.0" encoding="utf-8"?>
-<p:sldLayout xmlns:a="http://schemas.openxmlformats.org/drawingml/2006/main" xmlns:r="http://schemas.openxmlformats.org/officeDocument/2006/relationships" xmlns:p="http://schemas.openxmlformats.org/presentationml/2006/main" preserve="1" userDrawn="1">
+<p:sldLayout xmlns:a="http://schemas.openxmlformats.org/drawingml/2006/main" xmlns:r="http://schemas.openxmlformats.org/officeDocument/2006/relationships" xmlns:p="http://schemas.openxmlformats.org/presentationml/2006/main" showMasterSp="0" preserve="1" userDrawn="1">
   <p:cSld name="Section header">
     <p:spTree>
       <p:nvGrpSpPr>
@@ -1102,7 +1101,7 @@
         </p:nvSpPr>
         <p:spPr>
           <a:xfrm>
-            <a:off x="623888" y="1709739"/>
+            <a:off x="623888" y="733554"/>
             <a:ext cx="7886700" cy="2852737"/>
           </a:xfrm>
           <a:prstGeom prst="rect">
@@ -1158,7 +1157,7 @@
         </p:nvSpPr>
         <p:spPr>
           <a:xfrm>
-            <a:off x="623888" y="4589464"/>
+            <a:off x="623888" y="3613279"/>
             <a:ext cx="7886700" cy="1500187"/>
           </a:xfrm>
           <a:prstGeom prst="rect">
@@ -1347,10 +1346,10 @@
             </a:lvl1pPr>
           </a:lstStyle>
           <a:p>
-            <a:fld id="{C7A52CA1-0F5D-44D3-B9E6-0F79F6A90698}" type="datetime1">
-              <a:rPr lang="en-US" smtClean="0"/>
-              <a:t>10/5/2018</a:t>
-            </a:fld>
+            <a:r>
+              <a:rPr lang="en-US"/>
+              <a:t>2019-07-18</a:t>
+            </a:r>
             <a:endParaRPr lang="en-US" dirty="0"/>
           </a:p>
         </p:txBody>
@@ -1457,12 +1456,11 @@
   <p:clrMapOvr>
     <a:masterClrMapping/>
   </p:clrMapOvr>
-  <p:hf hdr="0"/>
 </p:sldLayout>
 </file>
 
 <file path=ppt/slideLayouts/slideLayout4.xml><?xml version="1.0" encoding="utf-8"?>
-<p:sldLayout xmlns:a="http://schemas.openxmlformats.org/drawingml/2006/main" xmlns:r="http://schemas.openxmlformats.org/officeDocument/2006/relationships" xmlns:p="http://schemas.openxmlformats.org/presentationml/2006/main" preserve="1" userDrawn="1">
+<p:sldLayout xmlns:a="http://schemas.openxmlformats.org/drawingml/2006/main" xmlns:r="http://schemas.openxmlformats.org/officeDocument/2006/relationships" xmlns:p="http://schemas.openxmlformats.org/presentationml/2006/main" showMasterSp="0" preserve="1" userDrawn="1">
   <p:cSld name="Two Content">
     <p:spTree>
       <p:nvGrpSpPr>
@@ -1480,71 +1478,18 @@
       </p:grpSpPr>
       <p:sp>
         <p:nvSpPr>
-          <p:cNvPr id="2" name="Title 1"/>
-          <p:cNvSpPr>
-            <a:spLocks noGrp="1"/>
-          </p:cNvSpPr>
-          <p:nvPr>
-            <p:ph type="title"/>
+          <p:cNvPr id="3" name="Content Placeholder 2"/>
+          <p:cNvSpPr>
+            <a:spLocks noGrp="1"/>
+          </p:cNvSpPr>
+          <p:nvPr>
+            <p:ph sz="half" idx="1"/>
           </p:nvPr>
         </p:nvSpPr>
         <p:spPr>
           <a:xfrm>
-            <a:off x="457200" y="773791"/>
-            <a:ext cx="8229600" cy="1144361"/>
-          </a:xfrm>
-          <a:prstGeom prst="rect">
-            <a:avLst/>
-          </a:prstGeom>
-        </p:spPr>
-        <p:txBody>
-          <a:bodyPr anchor="t" anchorCtr="0">
-            <a:normAutofit/>
-          </a:bodyPr>
-          <a:lstStyle>
-            <a:lvl1pPr algn="l" defTabSz="914400" rtl="0" eaLnBrk="1" fontAlgn="base" latinLnBrk="0" hangingPunct="1">
-              <a:lnSpc>
-                <a:spcPct val="90000"/>
-              </a:lnSpc>
-              <a:spcBef>
-                <a:spcPct val="0"/>
-              </a:spcBef>
-              <a:spcAft>
-                <a:spcPct val="0"/>
-              </a:spcAft>
-              <a:buNone/>
-              <a:defRPr lang="en-US" sz="3400" b="1" kern="1200" dirty="0">
-                <a:solidFill>
-                  <a:srgbClr val="026CB6"/>
-                </a:solidFill>
-                <a:latin typeface="Arial" panose="020B0604020202020204" pitchFamily="34" charset="0"/>
-                <a:ea typeface="+mj-ea"/>
-                <a:cs typeface="Arial" panose="020B0604020202020204" pitchFamily="34" charset="0"/>
-              </a:defRPr>
-            </a:lvl1pPr>
-          </a:lstStyle>
-          <a:p>
-            <a:r>
-              <a:rPr lang="en-US" dirty="0"/>
-              <a:t>Click to edit Master title style</a:t>
-            </a:r>
-          </a:p>
-        </p:txBody>
-      </p:sp>
-      <p:sp>
-        <p:nvSpPr>
-          <p:cNvPr id="3" name="Content Placeholder 2"/>
-          <p:cNvSpPr>
-            <a:spLocks noGrp="1"/>
-          </p:cNvSpPr>
-          <p:nvPr>
-            <p:ph sz="half" idx="1"/>
-          </p:nvPr>
-        </p:nvSpPr>
-        <p:spPr>
-          <a:xfrm>
-            <a:off x="457200" y="2088682"/>
-            <a:ext cx="4038600" cy="4047106"/>
+            <a:off x="457200" y="1133475"/>
+            <a:ext cx="4038600" cy="5002313"/>
           </a:xfrm>
           <a:prstGeom prst="rect">
             <a:avLst/>
@@ -1630,8 +1575,8 @@
         </p:nvSpPr>
         <p:spPr>
           <a:xfrm>
-            <a:off x="4648200" y="2088682"/>
-            <a:ext cx="4038600" cy="4047106"/>
+            <a:off x="4648200" y="1133475"/>
+            <a:ext cx="4038600" cy="5002313"/>
           </a:xfrm>
           <a:prstGeom prst="rect">
             <a:avLst/>
@@ -1749,10 +1694,10 @@
       </p:sp>
       <p:sp>
         <p:nvSpPr>
-          <p:cNvPr id="6" name="Date Placeholder 1">
+          <p:cNvPr id="10" name="Date Placeholder 9">
             <a:extLst>
               <a:ext uri="{FF2B5EF4-FFF2-40B4-BE49-F238E27FC236}">
-                <a16:creationId xmlns:a16="http://schemas.microsoft.com/office/drawing/2014/main" id="{314CE301-EEE0-403F-808F-7DA00DEF0AE9}"/>
+                <a16:creationId xmlns:a16="http://schemas.microsoft.com/office/drawing/2014/main" id="{076D06B0-0C87-4786-B61E-E14E3966F28B}"/>
               </a:ext>
             </a:extLst>
           </p:cNvPr>
@@ -1763,43 +1708,25 @@
             <p:ph type="dt" sz="half" idx="10"/>
           </p:nvPr>
         </p:nvSpPr>
-        <p:spPr>
-          <a:xfrm>
-            <a:off x="755755" y="6224589"/>
-            <a:ext cx="2057400" cy="228600"/>
-          </a:xfrm>
-          <a:prstGeom prst="rect">
-            <a:avLst/>
-          </a:prstGeom>
-        </p:spPr>
-        <p:txBody>
-          <a:bodyPr vert="horz" lIns="91440" tIns="45720" rIns="91440" bIns="45720" rtlCol="0" anchor="ctr" anchorCtr="0"/>
-          <a:lstStyle>
-            <a:lvl1pPr algn="l">
-              <a:defRPr sz="1200">
-                <a:solidFill>
-                  <a:schemeClr val="tx1">
-                    <a:tint val="75000"/>
-                  </a:schemeClr>
-                </a:solidFill>
-              </a:defRPr>
-            </a:lvl1pPr>
-          </a:lstStyle>
-          <a:p>
-            <a:fld id="{49DF7244-5CBA-4317-8F98-1E3343F26524}" type="datetime1">
-              <a:rPr lang="en-US" smtClean="0"/>
-              <a:t>10/5/2018</a:t>
-            </a:fld>
+        <p:spPr/>
+        <p:txBody>
+          <a:bodyPr/>
+          <a:lstStyle/>
+          <a:p>
+            <a:r>
+              <a:rPr lang="en-US"/>
+              <a:t>2019-07-18</a:t>
+            </a:r>
             <a:endParaRPr lang="en-US" dirty="0"/>
           </a:p>
         </p:txBody>
       </p:sp>
       <p:sp>
         <p:nvSpPr>
-          <p:cNvPr id="7" name="Footer Placeholder 2">
+          <p:cNvPr id="11" name="Footer Placeholder 10">
             <a:extLst>
               <a:ext uri="{FF2B5EF4-FFF2-40B4-BE49-F238E27FC236}">
-                <a16:creationId xmlns:a16="http://schemas.microsoft.com/office/drawing/2014/main" id="{DBFD53F9-6291-47DA-9FF1-D4775942F868}"/>
+                <a16:creationId xmlns:a16="http://schemas.microsoft.com/office/drawing/2014/main" id="{660F17D1-2328-435E-AB9E-8531B9F6A71D}"/>
               </a:ext>
             </a:extLst>
           </p:cNvPr>
@@ -1807,45 +1734,28 @@
             <a:spLocks noGrp="1"/>
           </p:cNvSpPr>
           <p:nvPr>
-            <p:ph type="ftr" sz="quarter" idx="3"/>
-          </p:nvPr>
-        </p:nvSpPr>
-        <p:spPr>
-          <a:xfrm>
-            <a:off x="3028950" y="6224589"/>
-            <a:ext cx="3086100" cy="228601"/>
-          </a:xfrm>
-          <a:prstGeom prst="rect">
-            <a:avLst/>
-          </a:prstGeom>
-        </p:spPr>
-        <p:txBody>
-          <a:bodyPr vert="horz" lIns="91440" tIns="45720" rIns="91440" bIns="45720" rtlCol="0" anchor="ctr" anchorCtr="1"/>
-          <a:lstStyle>
-            <a:lvl1pPr algn="ctr">
-              <a:defRPr sz="1200">
-                <a:solidFill>
-                  <a:schemeClr val="tx1">
-                    <a:tint val="75000"/>
-                  </a:schemeClr>
-                </a:solidFill>
-              </a:defRPr>
-            </a:lvl1pPr>
-          </a:lstStyle>
-          <a:p>
-            <a:r>
-              <a:rPr lang="en-US" dirty="0"/>
+            <p:ph type="ftr" sz="quarter" idx="11"/>
+          </p:nvPr>
+        </p:nvSpPr>
+        <p:spPr/>
+        <p:txBody>
+          <a:bodyPr/>
+          <a:lstStyle/>
+          <a:p>
+            <a:r>
+              <a:rPr lang="en-US"/>
               <a:t>U.S. Environmental Protection Agency</a:t>
             </a:r>
-          </a:p>
-        </p:txBody>
-      </p:sp>
-      <p:sp>
-        <p:nvSpPr>
-          <p:cNvPr id="8" name="Slide Number Placeholder 6">
+            <a:endParaRPr lang="en-US" dirty="0"/>
+          </a:p>
+        </p:txBody>
+      </p:sp>
+      <p:sp>
+        <p:nvSpPr>
+          <p:cNvPr id="12" name="Slide Number Placeholder 11">
             <a:extLst>
               <a:ext uri="{FF2B5EF4-FFF2-40B4-BE49-F238E27FC236}">
-                <a16:creationId xmlns:a16="http://schemas.microsoft.com/office/drawing/2014/main" id="{F70FDFD1-38AD-4949-B8AE-E81677E50138}"/>
+                <a16:creationId xmlns:a16="http://schemas.microsoft.com/office/drawing/2014/main" id="{E4C5FB7E-0D87-411F-AE05-3A243160B8F0}"/>
               </a:ext>
             </a:extLst>
           </p:cNvPr>
@@ -1853,29 +1763,13 @@
             <a:spLocks noGrp="1"/>
           </p:cNvSpPr>
           <p:nvPr>
-            <p:ph type="sldNum" sz="quarter" idx="4"/>
-          </p:nvPr>
-        </p:nvSpPr>
-        <p:spPr>
-          <a:xfrm>
-            <a:off x="0" y="6224588"/>
-            <a:ext cx="685800" cy="228600"/>
-          </a:xfrm>
-          <a:prstGeom prst="rect">
-            <a:avLst/>
-          </a:prstGeom>
-        </p:spPr>
-        <p:txBody>
-          <a:bodyPr vert="horz" lIns="91440" tIns="45720" rIns="91440" bIns="45720" rtlCol="0" anchor="ctr"/>
-          <a:lstStyle>
-            <a:lvl1pPr algn="r">
-              <a:defRPr sz="1200">
-                <a:solidFill>
-                  <a:schemeClr val="bg1"/>
-                </a:solidFill>
-              </a:defRPr>
-            </a:lvl1pPr>
-          </a:lstStyle>
+            <p:ph type="sldNum" sz="quarter" idx="12"/>
+          </p:nvPr>
+        </p:nvSpPr>
+        <p:spPr/>
+        <p:txBody>
+          <a:bodyPr/>
+          <a:lstStyle/>
           <a:p>
             <a:fld id="{60C87013-D2DE-43D0-B990-F403AB8CB211}" type="slidenum">
               <a:rPr lang="en-US" smtClean="0"/>
@@ -1883,6 +1777,65 @@
               <a:t>‹#›</a:t>
             </a:fld>
             <a:endParaRPr lang="en-US" dirty="0"/>
+          </a:p>
+        </p:txBody>
+      </p:sp>
+      <p:sp>
+        <p:nvSpPr>
+          <p:cNvPr id="13" name="Title 1">
+            <a:extLst>
+              <a:ext uri="{FF2B5EF4-FFF2-40B4-BE49-F238E27FC236}">
+                <a16:creationId xmlns:a16="http://schemas.microsoft.com/office/drawing/2014/main" id="{4C6F246C-D1D1-4B01-B9F9-AF542DBD4DF6}"/>
+              </a:ext>
+            </a:extLst>
+          </p:cNvPr>
+          <p:cNvSpPr>
+            <a:spLocks noGrp="1"/>
+          </p:cNvSpPr>
+          <p:nvPr>
+            <p:ph type="title"/>
+          </p:nvPr>
+        </p:nvSpPr>
+        <p:spPr>
+          <a:xfrm>
+            <a:off x="457200" y="62175"/>
+            <a:ext cx="8229600" cy="1071300"/>
+          </a:xfrm>
+          <a:prstGeom prst="rect">
+            <a:avLst/>
+          </a:prstGeom>
+        </p:spPr>
+        <p:txBody>
+          <a:bodyPr>
+            <a:normAutofit/>
+          </a:bodyPr>
+          <a:lstStyle>
+            <a:lvl1pPr algn="l" defTabSz="914400" rtl="0" eaLnBrk="1" fontAlgn="base" latinLnBrk="0" hangingPunct="1">
+              <a:lnSpc>
+                <a:spcPct val="90000"/>
+              </a:lnSpc>
+              <a:spcBef>
+                <a:spcPct val="0"/>
+              </a:spcBef>
+              <a:spcAft>
+                <a:spcPct val="0"/>
+              </a:spcAft>
+              <a:buNone/>
+              <a:defRPr lang="en-US" sz="3400" b="1" kern="1200" dirty="0">
+                <a:solidFill>
+                  <a:srgbClr val="026CB6"/>
+                </a:solidFill>
+                <a:latin typeface="Arial" panose="020B0604020202020204" pitchFamily="34" charset="0"/>
+                <a:ea typeface="+mj-ea"/>
+                <a:cs typeface="Arial" panose="020B0604020202020204" pitchFamily="34" charset="0"/>
+              </a:defRPr>
+            </a:lvl1pPr>
+          </a:lstStyle>
+          <a:p>
+            <a:r>
+              <a:rPr lang="en-US" dirty="0"/>
+              <a:t>Click to edit Master title style</a:t>
+            </a:r>
           </a:p>
         </p:txBody>
       </p:sp>
@@ -1896,7 +1849,6 @@
   <p:clrMapOvr>
     <a:masterClrMapping/>
   </p:clrMapOvr>
-  <p:hf hdr="0"/>
 </p:sldLayout>
 </file>
 
@@ -3087,76 +3039,6 @@
           <a:chExt cx="0" cy="0"/>
         </a:xfrm>
       </p:grpSpPr>
-      <p:pic>
-        <p:nvPicPr>
-          <p:cNvPr id="9" name="Picture 2">
-            <a:extLst>
-              <a:ext uri="{FF2B5EF4-FFF2-40B4-BE49-F238E27FC236}">
-                <a16:creationId xmlns:a16="http://schemas.microsoft.com/office/drawing/2014/main" id="{CAA6432D-A92A-4E3B-9327-B411BAD6A908}"/>
-              </a:ext>
-            </a:extLst>
-          </p:cNvPr>
-          <p:cNvPicPr>
-            <a:picLocks noChangeAspect="1" noChangeArrowheads="1"/>
-          </p:cNvPicPr>
-          <p:nvPr userDrawn="1"/>
-        </p:nvPicPr>
-        <p:blipFill>
-          <a:blip r:embed="rId6" cstate="print">
-            <a:extLst>
-              <a:ext uri="{28A0092B-C50C-407E-A947-70E740481C1C}">
-                <a14:useLocalDpi xmlns:a14="http://schemas.microsoft.com/office/drawing/2010/main" val="0"/>
-              </a:ext>
-            </a:extLst>
-          </a:blip>
-          <a:srcRect/>
-          <a:stretch>
-            <a:fillRect/>
-          </a:stretch>
-        </p:blipFill>
-        <p:spPr bwMode="auto">
-          <a:xfrm>
-            <a:off x="152400" y="152400"/>
-            <a:ext cx="1325040" cy="522288"/>
-          </a:xfrm>
-          <a:prstGeom prst="rect">
-            <a:avLst/>
-          </a:prstGeom>
-          <a:noFill/>
-          <a:ln>
-            <a:noFill/>
-          </a:ln>
-          <a:effectLst/>
-          <a:extLst>
-            <a:ext uri="{909E8E84-426E-40DD-AFC4-6F175D3DCCD1}">
-              <a14:hiddenFill xmlns:a14="http://schemas.microsoft.com/office/drawing/2010/main">
-                <a:solidFill>
-                  <a:schemeClr val="accent1"/>
-                </a:solidFill>
-              </a14:hiddenFill>
-            </a:ext>
-            <a:ext uri="{91240B29-F687-4F45-9708-019B960494DF}">
-              <a14:hiddenLine xmlns:a14="http://schemas.microsoft.com/office/drawing/2010/main" w="9525">
-                <a:solidFill>
-                  <a:schemeClr val="tx1"/>
-                </a:solidFill>
-                <a:miter lim="800000"/>
-                <a:headEnd/>
-                <a:tailEnd/>
-              </a14:hiddenLine>
-            </a:ext>
-            <a:ext uri="{AF507438-7753-43E0-B8FC-AC1667EBCBE1}">
-              <a14:hiddenEffects xmlns:a14="http://schemas.microsoft.com/office/drawing/2010/main">
-                <a:effectLst>
-                  <a:outerShdw dist="35921" dir="2700000" algn="ctr" rotWithShape="0">
-                    <a:schemeClr val="bg2"/>
-                  </a:outerShdw>
-                </a:effectLst>
-              </a14:hiddenEffects>
-            </a:ext>
-          </a:extLst>
-        </p:spPr>
-      </p:pic>
       <p:sp>
         <p:nvSpPr>
           <p:cNvPr id="19" name="Rectangle 18">
@@ -3238,10 +3120,10 @@
             </a:lvl1pPr>
           </a:lstStyle>
           <a:p>
-            <a:fld id="{67966315-8B24-4134-A404-E0B415783474}" type="datetime1">
-              <a:rPr lang="en-US" smtClean="0"/>
-              <a:t>10/5/2018</a:t>
-            </a:fld>
+            <a:r>
+              <a:rPr lang="en-US"/>
+              <a:t>2019-07-18</a:t>
+            </a:r>
             <a:endParaRPr lang="en-US" dirty="0"/>
           </a:p>
         </p:txBody>
@@ -3754,6 +3636,30 @@
             </a:r>
             <a:r>
               <a:rPr/>
+              <a:t>story</a:t>
+            </a:r>
+            <a:r>
+              <a:rPr/>
+              <a:t> </a:t>
+            </a:r>
+            <a:r>
+              <a:rPr/>
+              <a:t>of</a:t>
+            </a:r>
+            <a:r>
+              <a:rPr/>
+              <a:t> </a:t>
+            </a:r>
+            <a:r>
+              <a:rPr/>
+              <a:t>a</a:t>
+            </a:r>
+            <a:r>
+              <a:rPr/>
+              <a:t> </a:t>
+            </a:r>
+            <a:r>
+              <a:rPr/>
               <a:t>reluctant</a:t>
             </a:r>
             <a:r>
@@ -3814,9 +3720,22 @@
             </a:r>
             <a:br/>
             <a:br/>
-          </a:p>
-        </p:txBody>
-      </p:sp>
+            <a:r>
+              <a:rPr/>
+              <a:t>Jeff</a:t>
+            </a:r>
+            <a:r>
+              <a:rPr/>
+              <a:t> </a:t>
+            </a:r>
+            <a:r>
+              <a:rPr/>
+              <a:t>Hollister</a:t>
+            </a:r>
+          </a:p>
+        </p:txBody>
+      </p:sp>
+      <p:sp/>
     </p:spTree>
   </p:cSld>
 </p:sld>
@@ -3851,8 +3770,8 @@
         </p:nvSpPr>
         <p:spPr>
           <a:xfrm>
-            <a:off x="457200" y="775152"/>
-            <a:ext cx="8229600" cy="1143000"/>
+            <a:off x="457200" y="107879"/>
+            <a:ext cx="8229600" cy="1016071"/>
           </a:xfrm>
           <a:prstGeom prst="rect">
             <a:avLst/>
@@ -3988,8 +3907,8 @@
         </p:nvSpPr>
         <p:spPr>
           <a:xfrm>
-            <a:off x="457200" y="775152"/>
-            <a:ext cx="8229600" cy="1143000"/>
+            <a:off x="457200" y="107879"/>
+            <a:ext cx="8229600" cy="1016071"/>
           </a:xfrm>
           <a:prstGeom prst="rect">
             <a:avLst/>
@@ -4128,8 +4047,8 @@
         </p:nvSpPr>
         <p:spPr>
           <a:xfrm>
-            <a:off x="457200" y="775152"/>
-            <a:ext cx="8229600" cy="1143000"/>
+            <a:off x="457200" y="107879"/>
+            <a:ext cx="8229600" cy="1016071"/>
           </a:xfrm>
           <a:prstGeom prst="rect">
             <a:avLst/>
@@ -4245,8 +4164,8 @@
         </p:nvSpPr>
         <p:spPr>
           <a:xfrm>
-            <a:off x="457200" y="775152"/>
-            <a:ext cx="8229600" cy="1143000"/>
+            <a:off x="457200" y="107879"/>
+            <a:ext cx="8229600" cy="1016071"/>
           </a:xfrm>
           <a:prstGeom prst="rect">
             <a:avLst/>
@@ -4366,8 +4285,8 @@
         </p:nvSpPr>
         <p:spPr>
           <a:xfrm>
-            <a:off x="457200" y="775152"/>
-            <a:ext cx="8229600" cy="1143000"/>
+            <a:off x="457200" y="107879"/>
+            <a:ext cx="8229600" cy="1016071"/>
           </a:xfrm>
           <a:prstGeom prst="rect">
             <a:avLst/>
@@ -4490,8 +4409,8 @@
         </p:nvSpPr>
         <p:spPr>
           <a:xfrm>
-            <a:off x="457200" y="775152"/>
-            <a:ext cx="8229600" cy="1143000"/>
+            <a:off x="457200" y="107879"/>
+            <a:ext cx="8229600" cy="1016071"/>
           </a:xfrm>
           <a:prstGeom prst="rect">
             <a:avLst/>
@@ -4598,8 +4517,8 @@
         </p:nvSpPr>
         <p:spPr>
           <a:xfrm>
-            <a:off x="457200" y="775152"/>
-            <a:ext cx="8229600" cy="1143000"/>
+            <a:off x="457200" y="107879"/>
+            <a:ext cx="8229600" cy="1016071"/>
           </a:xfrm>
           <a:prstGeom prst="rect">
             <a:avLst/>
@@ -4707,8 +4626,8 @@
         </p:nvSpPr>
         <p:spPr>
           <a:xfrm>
-            <a:off x="457200" y="775152"/>
-            <a:ext cx="8229600" cy="1143000"/>
+            <a:off x="457200" y="107879"/>
+            <a:ext cx="8229600" cy="1016071"/>
           </a:xfrm>
           <a:prstGeom prst="rect">
             <a:avLst/>
@@ -4823,8 +4742,8 @@
         </p:nvSpPr>
         <p:spPr>
           <a:xfrm>
-            <a:off x="457200" y="775152"/>
-            <a:ext cx="8229600" cy="1143000"/>
+            <a:off x="457200" y="107879"/>
+            <a:ext cx="8229600" cy="1016071"/>
           </a:xfrm>
           <a:prstGeom prst="rect">
             <a:avLst/>
@@ -4916,8 +4835,8 @@
         </p:nvSpPr>
         <p:spPr>
           <a:xfrm>
-            <a:off x="457200" y="775152"/>
-            <a:ext cx="8229600" cy="1143000"/>
+            <a:off x="457200" y="107879"/>
+            <a:ext cx="8229600" cy="1016071"/>
           </a:xfrm>
           <a:prstGeom prst="rect">
             <a:avLst/>
@@ -5032,8 +4951,8 @@
         </p:nvSpPr>
         <p:spPr>
           <a:xfrm>
-            <a:off x="457200" y="775152"/>
-            <a:ext cx="8229600" cy="1143000"/>
+            <a:off x="457200" y="107879"/>
+            <a:ext cx="8229600" cy="1016071"/>
           </a:xfrm>
           <a:prstGeom prst="rect">
             <a:avLst/>
@@ -5139,8 +5058,8 @@
         </p:nvSpPr>
         <p:spPr>
           <a:xfrm>
-            <a:off x="457200" y="775152"/>
-            <a:ext cx="8229600" cy="1143000"/>
+            <a:off x="457200" y="107879"/>
+            <a:ext cx="8229600" cy="1016071"/>
           </a:xfrm>
           <a:prstGeom prst="rect">
             <a:avLst/>
@@ -5276,8 +5195,8 @@
         </p:nvSpPr>
         <p:spPr>
           <a:xfrm>
-            <a:off x="457200" y="775152"/>
-            <a:ext cx="8229600" cy="1143000"/>
+            <a:off x="457200" y="107879"/>
+            <a:ext cx="8229600" cy="1016071"/>
           </a:xfrm>
           <a:prstGeom prst="rect">
             <a:avLst/>
@@ -5369,8 +5288,8 @@
         </p:nvSpPr>
         <p:spPr>
           <a:xfrm>
-            <a:off x="457200" y="775152"/>
-            <a:ext cx="8229600" cy="1143000"/>
+            <a:off x="457200" y="107879"/>
+            <a:ext cx="8229600" cy="1016071"/>
           </a:xfrm>
           <a:prstGeom prst="rect">
             <a:avLst/>
@@ -5432,6 +5351,15 @@
             <a:r>
               <a:rPr/>
               <a:t>Much of this progress required a bit of subversion (doing things we weren’t supposed to do)</a:t>
+            </a:r>
+          </a:p>
+          <a:p>
+            <a:pPr lvl="0" marL="1270000" indent="0">
+              <a:buNone/>
+            </a:pPr>
+            <a:r>
+              <a:rPr sz="2000"/>
+              <a:t>095d2ee24a620dfb7e37fd2cd51f931cb4a732c9</a:t>
             </a:r>
           </a:p>
         </p:txBody>
@@ -5460,7 +5388,13 @@
       </p:grpSpPr>
       <p:sp>
         <p:nvSpPr>
-          <p:cNvPr id="2" name="Title 1"/>
+          <p:cNvPr id="13" name="Title 1">
+            <a:extLst>
+              <a:ext uri="{FF2B5EF4-FFF2-40B4-BE49-F238E27FC236}">
+                <a16:creationId xmlns:a16="http://schemas.microsoft.com/office/drawing/2014/main" id="{4C6F246C-D1D1-4B01-B9F9-AF542DBD4DF6}"/>
+              </a:ext>
+            </a:extLst>
+          </p:cNvPr>
           <p:cNvSpPr>
             <a:spLocks noGrp="1"/>
           </p:cNvSpPr>
@@ -5470,8 +5404,8 @@
         </p:nvSpPr>
         <p:spPr>
           <a:xfrm>
-            <a:off x="457200" y="775152"/>
-            <a:ext cx="8229600" cy="1143000"/>
+            <a:off x="457200" y="62175"/>
+            <a:ext cx="8229600" cy="1071300"/>
           </a:xfrm>
           <a:prstGeom prst="rect">
             <a:avLst/>
@@ -5506,7 +5440,7 @@
             <a:spLocks noGrp="1"/>
           </p:cNvSpPr>
           <p:nvPr>
-            <p:ph idx="1"/>
+            <p:ph sz="half" idx="1"/>
           </p:nvPr>
         </p:nvSpPr>
         <p:spPr/>
@@ -5522,32 +5456,25 @@
             </a:pPr>
             <a:r>
               <a:rPr b="1"/>
-              <a:t>Computional Ecology Group</a:t>
-            </a:r>
-          </a:p>
-          <a:p>
-            <a:pPr lvl="1"/>
-            <a:r>
-              <a:rPr/>
-              <a:t>3 FTE</a:t>
-            </a:r>
-          </a:p>
-          <a:p>
-            <a:pPr lvl="2"/>
+              <a:t>Lakes/Computational Ecology</a:t>
+            </a:r>
+          </a:p>
+          <a:p>
+            <a:pPr lvl="1"/>
             <a:r>
               <a:rPr/>
               <a:t>Myself</a:t>
             </a:r>
           </a:p>
           <a:p>
-            <a:pPr lvl="2"/>
+            <a:pPr lvl="1"/>
             <a:r>
               <a:rPr/>
               <a:t>Betty Kreakie</a:t>
             </a:r>
           </a:p>
           <a:p>
-            <a:pPr lvl="2"/>
+            <a:pPr lvl="1"/>
             <a:r>
               <a:rPr/>
               <a:t>Bryan Milstead</a:t>
@@ -5557,13 +5484,6 @@
             <a:pPr lvl="1"/>
             <a:r>
               <a:rPr/>
-              <a:t>1 Post-doc</a:t>
-            </a:r>
-          </a:p>
-          <a:p>
-            <a:pPr lvl="2"/>
-            <a:r>
-              <a:rPr/>
               <a:t>Stephen Shivers</a:t>
             </a:r>
           </a:p>
@@ -5571,13 +5491,6 @@
             <a:pPr lvl="1"/>
             <a:r>
               <a:rPr/>
-              <a:t>1 Research technician</a:t>
-            </a:r>
-          </a:p>
-          <a:p>
-            <a:pPr lvl="2"/>
-            <a:r>
-              <a:rPr/>
               <a:t>Sophie Fournier</a:t>
             </a:r>
           </a:p>
@@ -5585,16 +5498,25 @@
             <a:pPr lvl="1"/>
             <a:r>
               <a:rPr/>
-              <a:t>Alum</a:t>
-            </a:r>
-          </a:p>
-          <a:p>
-            <a:pPr lvl="2"/>
-            <a:r>
-              <a:rPr/>
-              <a:t>Farnaz Nojavan (now a Data Scientist at FM Global)</a:t>
-            </a:r>
-          </a:p>
+              <a:t>Farnaz Nojavan (Alumnus: now a Data Scientist at FM Global)</a:t>
+            </a:r>
+          </a:p>
+        </p:txBody>
+      </p:sp>
+      <p:sp>
+        <p:nvSpPr>
+          <p:cNvPr id="4" name="Content Placeholder 3"/>
+          <p:cNvSpPr>
+            <a:spLocks noGrp="1"/>
+          </p:cNvSpPr>
+          <p:nvPr>
+            <p:ph sz="half" idx="2"/>
+          </p:nvPr>
+        </p:nvSpPr>
+        <p:spPr/>
+        <p:txBody>
+          <a:bodyPr/>
+          <a:lstStyle/>
           <a:p>
             <a:pPr lvl="0" marL="0" indent="0">
               <a:spcBef>
@@ -5699,8 +5621,8 @@
         </p:nvSpPr>
         <p:spPr>
           <a:xfrm>
-            <a:off x="457200" y="775152"/>
-            <a:ext cx="8229600" cy="1143000"/>
+            <a:off x="457200" y="107879"/>
+            <a:ext cx="8229600" cy="1016071"/>
           </a:xfrm>
           <a:prstGeom prst="rect">
             <a:avLst/>
@@ -5812,8 +5734,8 @@
         </p:nvSpPr>
         <p:spPr>
           <a:xfrm>
-            <a:off x="457200" y="775152"/>
-            <a:ext cx="8229600" cy="1143000"/>
+            <a:off x="457200" y="107879"/>
+            <a:ext cx="8229600" cy="1016071"/>
           </a:xfrm>
           <a:prstGeom prst="rect">
             <a:avLst/>
@@ -5921,8 +5843,8 @@
         </p:nvSpPr>
         <p:spPr>
           <a:xfrm>
-            <a:off x="457200" y="775152"/>
-            <a:ext cx="8229600" cy="1143000"/>
+            <a:off x="457200" y="107879"/>
+            <a:ext cx="8229600" cy="1016071"/>
           </a:xfrm>
           <a:prstGeom prst="rect">
             <a:avLst/>
@@ -6014,8 +5936,8 @@
         </p:nvSpPr>
         <p:spPr>
           <a:xfrm>
-            <a:off x="457200" y="775152"/>
-            <a:ext cx="8229600" cy="1143000"/>
+            <a:off x="457200" y="107879"/>
+            <a:ext cx="8229600" cy="1016071"/>
           </a:xfrm>
           <a:prstGeom prst="rect">
             <a:avLst/>
@@ -6137,8 +6059,8 @@
         </p:nvSpPr>
         <p:spPr>
           <a:xfrm>
-            <a:off x="457200" y="775152"/>
-            <a:ext cx="8229600" cy="1143000"/>
+            <a:off x="457200" y="107879"/>
+            <a:ext cx="8229600" cy="1016071"/>
           </a:xfrm>
           <a:prstGeom prst="rect">
             <a:avLst/>
@@ -6260,8 +6182,8 @@
         </p:nvSpPr>
         <p:spPr>
           <a:xfrm>
-            <a:off x="457200" y="775152"/>
-            <a:ext cx="8229600" cy="1143000"/>
+            <a:off x="457200" y="107879"/>
+            <a:ext cx="8229600" cy="1016071"/>
           </a:xfrm>
           <a:prstGeom prst="rect">
             <a:avLst/>

</xml_diff>